<commit_message>
fix error burger menu and bg white
</commit_message>
<xml_diff>
--- a/code presentation NG.pptx
+++ b/code presentation NG.pptx
@@ -104,6 +104,11 @@
       </a:defRPr>
     </a:lvl9pPr>
   </p:defaultTextStyle>
+  <p:extLst>
+    <p:ext uri="{EFAFB233-063F-42B5-8137-9DF3F51BA10A}">
+      <p15:sldGuideLst xmlns:p15="http://schemas.microsoft.com/office/powerpoint/2012/main"/>
+    </p:ext>
+  </p:extLst>
 </p:presentation>
 </file>
 
@@ -3342,8 +3347,37 @@
         </p:blipFill>
         <p:spPr>
           <a:xfrm>
-            <a:off x="164592" y="56357"/>
-            <a:ext cx="11861504" cy="6668533"/>
+            <a:off x="164591" y="56357"/>
+            <a:ext cx="8284083" cy="3267868"/>
+          </a:xfrm>
+          <a:prstGeom prst="rect">
+            <a:avLst/>
+          </a:prstGeom>
+        </p:spPr>
+      </p:pic>
+      <p:pic>
+        <p:nvPicPr>
+          <p:cNvPr id="3" name="Image 2">
+            <a:extLst>
+              <a:ext uri="{FF2B5EF4-FFF2-40B4-BE49-F238E27FC236}">
+                <a16:creationId xmlns:a16="http://schemas.microsoft.com/office/drawing/2014/main" id="{5AE85452-A695-4466-ADF4-CC9655F1089A}"/>
+              </a:ext>
+            </a:extLst>
+          </p:cNvPr>
+          <p:cNvPicPr>
+            <a:picLocks noChangeAspect="1"/>
+          </p:cNvPicPr>
+          <p:nvPr/>
+        </p:nvPicPr>
+        <p:blipFill rotWithShape="1">
+          <a:blip r:embed="rId3"/>
+          <a:srcRect l="2500" t="18611" r="56640" b="13889"/>
+          <a:stretch/>
+        </p:blipFill>
+        <p:spPr>
+          <a:xfrm>
+            <a:off x="3438459" y="2781301"/>
+            <a:ext cx="7954123" cy="3695700"/>
           </a:xfrm>
           <a:prstGeom prst="rect">
             <a:avLst/>

</xml_diff>